<commit_message>
Consistency update of DB presentations
Plus DB scripts and a Table template spreadsheet.
</commit_message>
<xml_diff>
--- a/Chap/DB/Presentations/DBDataMaintenance.pptx
+++ b/Chap/DB/Presentations/DBDataMaintenance.pptx
@@ -258,7 +258,7 @@
           <a:p>
             <a:fld id="{E15B7D8E-2A20-4C0E-991C-872DBB7459A8}" type="datetimeFigureOut">
               <a:rPr lang="da-DK" smtClean="0"/>
-              <a:t>10-09-2018</a:t>
+              <a:t>29-09-2018</a:t>
             </a:fld>
             <a:endParaRPr lang="da-DK"/>
           </a:p>
@@ -428,7 +428,7 @@
           <a:p>
             <a:fld id="{E15B7D8E-2A20-4C0E-991C-872DBB7459A8}" type="datetimeFigureOut">
               <a:rPr lang="da-DK" smtClean="0"/>
-              <a:t>10-09-2018</a:t>
+              <a:t>29-09-2018</a:t>
             </a:fld>
             <a:endParaRPr lang="da-DK"/>
           </a:p>
@@ -608,7 +608,7 @@
           <a:p>
             <a:fld id="{E15B7D8E-2A20-4C0E-991C-872DBB7459A8}" type="datetimeFigureOut">
               <a:rPr lang="da-DK" smtClean="0"/>
-              <a:t>10-09-2018</a:t>
+              <a:t>29-09-2018</a:t>
             </a:fld>
             <a:endParaRPr lang="da-DK"/>
           </a:p>
@@ -778,7 +778,7 @@
           <a:p>
             <a:fld id="{E15B7D8E-2A20-4C0E-991C-872DBB7459A8}" type="datetimeFigureOut">
               <a:rPr lang="da-DK" smtClean="0"/>
-              <a:t>10-09-2018</a:t>
+              <a:t>29-09-2018</a:t>
             </a:fld>
             <a:endParaRPr lang="da-DK"/>
           </a:p>
@@ -1024,7 +1024,7 @@
           <a:p>
             <a:fld id="{E15B7D8E-2A20-4C0E-991C-872DBB7459A8}" type="datetimeFigureOut">
               <a:rPr lang="da-DK" smtClean="0"/>
-              <a:t>10-09-2018</a:t>
+              <a:t>29-09-2018</a:t>
             </a:fld>
             <a:endParaRPr lang="da-DK"/>
           </a:p>
@@ -1256,7 +1256,7 @@
           <a:p>
             <a:fld id="{E15B7D8E-2A20-4C0E-991C-872DBB7459A8}" type="datetimeFigureOut">
               <a:rPr lang="da-DK" smtClean="0"/>
-              <a:t>10-09-2018</a:t>
+              <a:t>29-09-2018</a:t>
             </a:fld>
             <a:endParaRPr lang="da-DK"/>
           </a:p>
@@ -1623,7 +1623,7 @@
           <a:p>
             <a:fld id="{E15B7D8E-2A20-4C0E-991C-872DBB7459A8}" type="datetimeFigureOut">
               <a:rPr lang="da-DK" smtClean="0"/>
-              <a:t>10-09-2018</a:t>
+              <a:t>29-09-2018</a:t>
             </a:fld>
             <a:endParaRPr lang="da-DK"/>
           </a:p>
@@ -1741,7 +1741,7 @@
           <a:p>
             <a:fld id="{E15B7D8E-2A20-4C0E-991C-872DBB7459A8}" type="datetimeFigureOut">
               <a:rPr lang="da-DK" smtClean="0"/>
-              <a:t>10-09-2018</a:t>
+              <a:t>29-09-2018</a:t>
             </a:fld>
             <a:endParaRPr lang="da-DK"/>
           </a:p>
@@ -1836,7 +1836,7 @@
           <a:p>
             <a:fld id="{E15B7D8E-2A20-4C0E-991C-872DBB7459A8}" type="datetimeFigureOut">
               <a:rPr lang="da-DK" smtClean="0"/>
-              <a:t>10-09-2018</a:t>
+              <a:t>29-09-2018</a:t>
             </a:fld>
             <a:endParaRPr lang="da-DK"/>
           </a:p>
@@ -2113,7 +2113,7 @@
           <a:p>
             <a:fld id="{E15B7D8E-2A20-4C0E-991C-872DBB7459A8}" type="datetimeFigureOut">
               <a:rPr lang="da-DK" smtClean="0"/>
-              <a:t>10-09-2018</a:t>
+              <a:t>29-09-2018</a:t>
             </a:fld>
             <a:endParaRPr lang="da-DK"/>
           </a:p>
@@ -2366,7 +2366,7 @@
           <a:p>
             <a:fld id="{E15B7D8E-2A20-4C0E-991C-872DBB7459A8}" type="datetimeFigureOut">
               <a:rPr lang="da-DK" smtClean="0"/>
-              <a:t>10-09-2018</a:t>
+              <a:t>29-09-2018</a:t>
             </a:fld>
             <a:endParaRPr lang="da-DK"/>
           </a:p>
@@ -2579,7 +2579,7 @@
           <a:p>
             <a:fld id="{E15B7D8E-2A20-4C0E-991C-872DBB7459A8}" type="datetimeFigureOut">
               <a:rPr lang="da-DK" smtClean="0"/>
-              <a:t>10-09-2018</a:t>
+              <a:t>29-09-2018</a:t>
             </a:fld>
             <a:endParaRPr lang="da-DK"/>
           </a:p>
@@ -4190,10 +4190,14 @@
             </a:r>
             <a:r>
               <a:rPr lang="en-US" sz="3200" smtClean="0"/>
-              <a:t>director_id</a:t>
+              <a:t>id</a:t>
             </a:r>
             <a:r>
               <a:rPr lang="en-US" sz="3200"/>
+              <a:t>	</a:t>
+            </a:r>
+            <a:r>
+              <a:rPr lang="en-US" sz="3200" smtClean="0"/>
               <a:t>	</a:t>
             </a:r>
             <a:r>
@@ -4388,13 +4392,10 @@
               <a:t>PRIMARY KEY </a:t>
             </a:r>
             <a:r>
-              <a:rPr lang="en-US" sz="3200"/>
-              <a:t>(directorId</a:t>
-            </a:r>
-            <a:r>
               <a:rPr lang="en-US" sz="3200" smtClean="0"/>
-              <a:t>)</a:t>
-            </a:r>
+              <a:t>(id)</a:t>
+            </a:r>
+            <a:endParaRPr lang="en-US" sz="3200" smtClean="0"/>
           </a:p>
           <a:p>
             <a:pPr marL="0" indent="0">

</xml_diff>